<commit_message>
upload files for day 1
</commit_message>
<xml_diff>
--- a/day-1-power-bi-dataverse/day-1-power-bi-dataverse.pptx
+++ b/day-1-power-bi-dataverse/day-1-power-bi-dataverse.pptx
@@ -253,7 +253,7 @@
           <a:p>
             <a:fld id="{17A98A70-FA8C-4354-959C-C70678AC9BCF}" type="datetimeFigureOut">
               <a:rPr lang="en-US" smtClean="0"/>
-              <a:t>11/21/2025</a:t>
+              <a:t>12/1/2025</a:t>
             </a:fld>
             <a:endParaRPr lang="en-US"/>
           </a:p>
@@ -611,6 +611,328 @@
 </p:notes>
 </file>
 
+<file path=ppt/notesSlides/notesSlide2.xml><?xml version="1.0" encoding="utf-8"?>
+<p:notes xmlns:a="http://schemas.openxmlformats.org/drawingml/2006/main" xmlns:r="http://schemas.openxmlformats.org/officeDocument/2006/relationships" xmlns:p="http://schemas.openxmlformats.org/presentationml/2006/main">
+  <p:cSld>
+    <p:spTree>
+      <p:nvGrpSpPr>
+        <p:cNvPr id="1" name=""/>
+        <p:cNvGrpSpPr/>
+        <p:nvPr/>
+      </p:nvGrpSpPr>
+      <p:grpSpPr>
+        <a:xfrm>
+          <a:off x="0" y="0"/>
+          <a:ext cx="0" cy="0"/>
+          <a:chOff x="0" y="0"/>
+          <a:chExt cx="0" cy="0"/>
+        </a:xfrm>
+      </p:grpSpPr>
+      <p:sp>
+        <p:nvSpPr>
+          <p:cNvPr id="2" name="Slide Image Placeholder 1"/>
+          <p:cNvSpPr>
+            <a:spLocks noGrp="1" noRot="1" noChangeAspect="1"/>
+          </p:cNvSpPr>
+          <p:nvPr>
+            <p:ph type="sldImg"/>
+          </p:nvPr>
+        </p:nvSpPr>
+        <p:spPr/>
+      </p:sp>
+      <p:sp>
+        <p:nvSpPr>
+          <p:cNvPr id="3" name="Notes Placeholder 2"/>
+          <p:cNvSpPr>
+            <a:spLocks noGrp="1"/>
+          </p:cNvSpPr>
+          <p:nvPr>
+            <p:ph type="body" idx="1"/>
+          </p:nvPr>
+        </p:nvSpPr>
+        <p:spPr/>
+        <p:txBody>
+          <a:bodyPr/>
+          <a:lstStyle/>
+          <a:p>
+            <a:r>
+              <a:rPr lang="en-US" b="1" dirty="0"/>
+              <a:t>AI depends on clean, governed, trusted data</a:t>
+            </a:r>
+            <a:br>
+              <a:rPr lang="en-US" dirty="0"/>
+            </a:br>
+            <a:r>
+              <a:rPr lang="en-US" dirty="0"/>
+              <a:t>When people think “AI,” they think prompts — but the real magic actually comes from your data foundation. Copilot can only work with what you give it. If your data is messy, inconsistent, or missing key fields, your AI results will reflect that. Garbage in, garbage out… just faster.</a:t>
+            </a:r>
+          </a:p>
+          <a:p>
+            <a:r>
+              <a:rPr lang="en-US" b="1" dirty="0"/>
+              <a:t>Cloud-connected Excel gives Copilot real context and structure</a:t>
+            </a:r>
+            <a:br>
+              <a:rPr lang="en-US" dirty="0"/>
+            </a:br>
+            <a:r>
+              <a:rPr lang="en-US" dirty="0"/>
+              <a:t>When your workbook is connected to the cloud — OneDrive, SharePoint, Fabric, Dataverse — Excel actually </a:t>
+            </a:r>
+            <a:r>
+              <a:rPr lang="en-US" i="1" dirty="0"/>
+              <a:t>knows</a:t>
+            </a:r>
+            <a:r>
+              <a:rPr lang="en-US" dirty="0"/>
+              <a:t> what your tables are, how they relate, and how often they change. That gives Copilot a stable structure to work with instead of trying to interpret a bunch of disconnected spreadsheets.</a:t>
+            </a:r>
+          </a:p>
+          <a:p>
+            <a:r>
+              <a:rPr lang="en-US" b="1" dirty="0"/>
+              <a:t>Semantic models teach AI the meaning of your data</a:t>
+            </a:r>
+            <a:br>
+              <a:rPr lang="en-US" dirty="0"/>
+            </a:br>
+            <a:r>
+              <a:rPr lang="en-US" dirty="0"/>
+              <a:t>A semantic model is basically the “brain” of your data: it defines your tables, your relationships, your measures, and your business logic. When you connect to a Power BI semantic model from Excel, Copilot can reason about the meaning behind your fields — not just their labels. It understands what “Revenue,” “Customer,” or “Region” actually </a:t>
+            </a:r>
+            <a:r>
+              <a:rPr lang="en-US" i="1" dirty="0"/>
+              <a:t>mean</a:t>
+            </a:r>
+            <a:r>
+              <a:rPr lang="en-US" dirty="0"/>
+              <a:t> in your organization.</a:t>
+            </a:r>
+          </a:p>
+          <a:p>
+            <a:r>
+              <a:rPr lang="en-US" b="1" dirty="0"/>
+              <a:t>Dataverse provides consistent tables and relationships AI can use</a:t>
+            </a:r>
+            <a:br>
+              <a:rPr lang="en-US" dirty="0"/>
+            </a:br>
+            <a:r>
+              <a:rPr lang="en-US" dirty="0"/>
+              <a:t>Dataverse is your governed, standardized data layer. Everything has proper types, relationships, and metadata. When Excel pulls from Dataverse, Copilot works with data that’s already clean and modeled, instead of 50 different versions of the same dataset floating around in personal spreadsheets.</a:t>
+            </a:r>
+          </a:p>
+          <a:p>
+            <a:r>
+              <a:rPr lang="en-US" b="1" dirty="0"/>
+              <a:t>Better data foundations mean better prompts, better answers, fewer errors</a:t>
+            </a:r>
+            <a:br>
+              <a:rPr lang="en-US" dirty="0"/>
+            </a:br>
+            <a:r>
+              <a:rPr lang="en-US" dirty="0"/>
+              <a:t>At the end of the day, strong data foundations make you look like a genius with AI. Prompts land more accurately. Copilot produces cleaner results. And you spend far less time debugging formulas or rewriting analyses. This is why Modern Excel isn’t just about AI — it’s about preparing your data so AI can actually help you.</a:t>
+            </a:r>
+          </a:p>
+          <a:p>
+            <a:endParaRPr lang="en-US" dirty="0"/>
+          </a:p>
+        </p:txBody>
+      </p:sp>
+      <p:sp>
+        <p:nvSpPr>
+          <p:cNvPr id="4" name="Slide Number Placeholder 3"/>
+          <p:cNvSpPr>
+            <a:spLocks noGrp="1"/>
+          </p:cNvSpPr>
+          <p:nvPr>
+            <p:ph type="sldNum" sz="quarter" idx="5"/>
+          </p:nvPr>
+        </p:nvSpPr>
+        <p:spPr/>
+        <p:txBody>
+          <a:bodyPr/>
+          <a:lstStyle/>
+          <a:p>
+            <a:fld id="{FFB500C5-13F7-48FC-8160-C29AECF6C602}" type="slidenum">
+              <a:rPr lang="en-US" smtClean="0"/>
+              <a:t>7</a:t>
+            </a:fld>
+            <a:endParaRPr lang="en-US"/>
+          </a:p>
+        </p:txBody>
+      </p:sp>
+    </p:spTree>
+    <p:extLst>
+      <p:ext uri="{BB962C8B-B14F-4D97-AF65-F5344CB8AC3E}">
+        <p14:creationId xmlns:p14="http://schemas.microsoft.com/office/powerpoint/2010/main" val="3005231856"/>
+      </p:ext>
+    </p:extLst>
+  </p:cSld>
+  <p:clrMapOvr>
+    <a:masterClrMapping/>
+  </p:clrMapOvr>
+</p:notes>
+</file>
+
+<file path=ppt/notesSlides/notesSlide3.xml><?xml version="1.0" encoding="utf-8"?>
+<p:notes xmlns:a="http://schemas.openxmlformats.org/drawingml/2006/main" xmlns:r="http://schemas.openxmlformats.org/officeDocument/2006/relationships" xmlns:p="http://schemas.openxmlformats.org/presentationml/2006/main">
+  <p:cSld>
+    <p:spTree>
+      <p:nvGrpSpPr>
+        <p:cNvPr id="1" name=""/>
+        <p:cNvGrpSpPr/>
+        <p:nvPr/>
+      </p:nvGrpSpPr>
+      <p:grpSpPr>
+        <a:xfrm>
+          <a:off x="0" y="0"/>
+          <a:ext cx="0" cy="0"/>
+          <a:chOff x="0" y="0"/>
+          <a:chExt cx="0" cy="0"/>
+        </a:xfrm>
+      </p:grpSpPr>
+      <p:sp>
+        <p:nvSpPr>
+          <p:cNvPr id="2" name="Slide Image Placeholder 1"/>
+          <p:cNvSpPr>
+            <a:spLocks noGrp="1" noRot="1" noChangeAspect="1"/>
+          </p:cNvSpPr>
+          <p:nvPr>
+            <p:ph type="sldImg"/>
+          </p:nvPr>
+        </p:nvSpPr>
+        <p:spPr/>
+      </p:sp>
+      <p:sp>
+        <p:nvSpPr>
+          <p:cNvPr id="3" name="Notes Placeholder 2"/>
+          <p:cNvSpPr>
+            <a:spLocks noGrp="1"/>
+          </p:cNvSpPr>
+          <p:nvPr>
+            <p:ph type="body" idx="1"/>
+          </p:nvPr>
+        </p:nvSpPr>
+        <p:spPr/>
+        <p:txBody>
+          <a:bodyPr/>
+          <a:lstStyle/>
+          <a:p>
+            <a:r>
+              <a:rPr lang="en-US" b="1" dirty="0"/>
+              <a:t>Day 2 preview: Data cleaning the modern way</a:t>
+            </a:r>
+            <a:br>
+              <a:rPr lang="en-US" dirty="0"/>
+            </a:br>
+            <a:r>
+              <a:rPr lang="en-US" dirty="0"/>
+              <a:t>Tomorrow we shift from “what AI needs” to “how we actually get there.” The modern data stack starts with cleaning and shaping your raw data so everything downstream — AI, automation, reporting — actually works.</a:t>
+            </a:r>
+          </a:p>
+          <a:p>
+            <a:r>
+              <a:rPr lang="en-US" b="1" dirty="0"/>
+              <a:t>Build repeatable cleaning and shaping steps with Power Query</a:t>
+            </a:r>
+            <a:br>
+              <a:rPr lang="en-US" dirty="0"/>
+            </a:br>
+            <a:r>
+              <a:rPr lang="en-US" dirty="0"/>
+              <a:t>Power Query is where you stop fixing data manually. Every transformation you apply — splitting columns, fixing data types, removing errors — is recorded as a step. So instead of rebuilding cleanup every week, you just click </a:t>
+            </a:r>
+            <a:r>
+              <a:rPr lang="en-US" i="1" dirty="0"/>
+              <a:t>Refresh</a:t>
+            </a:r>
+            <a:r>
+              <a:rPr lang="en-US" dirty="0"/>
+              <a:t>. This is where analysts start saving hours per report.</a:t>
+            </a:r>
+          </a:p>
+          <a:p>
+            <a:r>
+              <a:rPr lang="en-US" b="1" dirty="0"/>
+              <a:t>Publish transformations to the cloud as Dataflows</a:t>
+            </a:r>
+            <a:br>
+              <a:rPr lang="en-US" dirty="0"/>
+            </a:br>
+            <a:r>
+              <a:rPr lang="en-US" dirty="0"/>
+              <a:t>Once your Power Query steps are working locally, you can publish them as Dataflows in the cloud. That turns your one-off cleanup into a reusable, centralized process that your whole team can use. It’s the same logic, just elevated from “my file” to “our shared data pipeline.”</a:t>
+            </a:r>
+          </a:p>
+          <a:p>
+            <a:r>
+              <a:rPr lang="en-US" b="1" dirty="0"/>
+              <a:t>Feed clean, certified data into Excel and Power BI</a:t>
+            </a:r>
+            <a:br>
+              <a:rPr lang="en-US" dirty="0"/>
+            </a:br>
+            <a:r>
+              <a:rPr lang="en-US" dirty="0"/>
+              <a:t>With Dataflows, the clean data becomes a source you can pull into both Excel and Power BI — and you know everyone is pulling the same, consistent version. No more email attachments and no more “which file is the right one?”</a:t>
+            </a:r>
+          </a:p>
+          <a:p>
+            <a:r>
+              <a:rPr lang="en-US" b="1" dirty="0"/>
+              <a:t>Set the stage for reliable AI, automation, and reporting</a:t>
+            </a:r>
+            <a:br>
+              <a:rPr lang="en-US" dirty="0"/>
+            </a:br>
+            <a:r>
+              <a:rPr lang="en-US" dirty="0"/>
+              <a:t>When your cleanup is automated and standardized, everything built on top of it becomes more reliable. Copilot works better. Office Scripts and Power Automate flows work better. And your reports stop breaking the night before the meeting. Clean data isn’t glamorous, but it’s the foundation of every good AI workflow.</a:t>
+            </a:r>
+          </a:p>
+          <a:p>
+            <a:endParaRPr lang="en-US" dirty="0"/>
+          </a:p>
+        </p:txBody>
+      </p:sp>
+      <p:sp>
+        <p:nvSpPr>
+          <p:cNvPr id="4" name="Slide Number Placeholder 3"/>
+          <p:cNvSpPr>
+            <a:spLocks noGrp="1"/>
+          </p:cNvSpPr>
+          <p:nvPr>
+            <p:ph type="sldNum" sz="quarter" idx="5"/>
+          </p:nvPr>
+        </p:nvSpPr>
+        <p:spPr/>
+        <p:txBody>
+          <a:bodyPr/>
+          <a:lstStyle/>
+          <a:p>
+            <a:fld id="{FFB500C5-13F7-48FC-8160-C29AECF6C602}" type="slidenum">
+              <a:rPr lang="en-US" smtClean="0"/>
+              <a:t>8</a:t>
+            </a:fld>
+            <a:endParaRPr lang="en-US"/>
+          </a:p>
+        </p:txBody>
+      </p:sp>
+    </p:spTree>
+    <p:extLst>
+      <p:ext uri="{BB962C8B-B14F-4D97-AF65-F5344CB8AC3E}">
+        <p14:creationId xmlns:p14="http://schemas.microsoft.com/office/powerpoint/2010/main" val="2320719792"/>
+      </p:ext>
+    </p:extLst>
+  </p:cSld>
+  <p:clrMapOvr>
+    <a:masterClrMapping/>
+  </p:clrMapOvr>
+</p:notes>
+</file>
+
 <file path=ppt/slideLayouts/slideLayout1.xml><?xml version="1.0" encoding="utf-8"?>
 <p:sldLayout xmlns:a="http://schemas.openxmlformats.org/drawingml/2006/main" xmlns:r="http://schemas.openxmlformats.org/officeDocument/2006/relationships" xmlns:p="http://schemas.openxmlformats.org/presentationml/2006/main" type="title" preserve="1">
   <p:cSld name="Title Slide">
@@ -791,7 +1113,7 @@
             <a:fld id="{1D8BD707-D9CF-40AE-B4C6-C98DA3205C09}" type="datetimeFigureOut">
               <a:rPr lang="en-US" smtClean="0"/>
               <a:pPr/>
-              <a:t>11/21/2025</a:t>
+              <a:t>12/1/2025</a:t>
             </a:fld>
             <a:endParaRPr lang="en-US"/>
           </a:p>
@@ -956,7 +1278,7 @@
             <a:fld id="{1D8BD707-D9CF-40AE-B4C6-C98DA3205C09}" type="datetimeFigureOut">
               <a:rPr lang="en-US" smtClean="0"/>
               <a:pPr/>
-              <a:t>11/21/2025</a:t>
+              <a:t>12/1/2025</a:t>
             </a:fld>
             <a:endParaRPr lang="en-US"/>
           </a:p>
@@ -1131,7 +1453,7 @@
             <a:fld id="{1D8BD707-D9CF-40AE-B4C6-C98DA3205C09}" type="datetimeFigureOut">
               <a:rPr lang="en-US" smtClean="0"/>
               <a:pPr/>
-              <a:t>11/21/2025</a:t>
+              <a:t>12/1/2025</a:t>
             </a:fld>
             <a:endParaRPr lang="en-US"/>
           </a:p>
@@ -1296,7 +1618,7 @@
             <a:fld id="{1D8BD707-D9CF-40AE-B4C6-C98DA3205C09}" type="datetimeFigureOut">
               <a:rPr lang="en-US" smtClean="0"/>
               <a:pPr/>
-              <a:t>11/21/2025</a:t>
+              <a:t>12/1/2025</a:t>
             </a:fld>
             <a:endParaRPr lang="en-US"/>
           </a:p>
@@ -1538,7 +1860,7 @@
             <a:fld id="{1D8BD707-D9CF-40AE-B4C6-C98DA3205C09}" type="datetimeFigureOut">
               <a:rPr lang="en-US" smtClean="0"/>
               <a:pPr/>
-              <a:t>11/21/2025</a:t>
+              <a:t>12/1/2025</a:t>
             </a:fld>
             <a:endParaRPr lang="en-US"/>
           </a:p>
@@ -1820,7 +2142,7 @@
             <a:fld id="{1D8BD707-D9CF-40AE-B4C6-C98DA3205C09}" type="datetimeFigureOut">
               <a:rPr lang="en-US" smtClean="0"/>
               <a:pPr/>
-              <a:t>11/21/2025</a:t>
+              <a:t>12/1/2025</a:t>
             </a:fld>
             <a:endParaRPr lang="en-US"/>
           </a:p>
@@ -2236,7 +2558,7 @@
             <a:fld id="{1D8BD707-D9CF-40AE-B4C6-C98DA3205C09}" type="datetimeFigureOut">
               <a:rPr lang="en-US" smtClean="0"/>
               <a:pPr/>
-              <a:t>11/21/2025</a:t>
+              <a:t>12/1/2025</a:t>
             </a:fld>
             <a:endParaRPr lang="en-US"/>
           </a:p>
@@ -2350,7 +2672,7 @@
             <a:fld id="{1D8BD707-D9CF-40AE-B4C6-C98DA3205C09}" type="datetimeFigureOut">
               <a:rPr lang="en-US" smtClean="0"/>
               <a:pPr/>
-              <a:t>11/21/2025</a:t>
+              <a:t>12/1/2025</a:t>
             </a:fld>
             <a:endParaRPr lang="en-US"/>
           </a:p>
@@ -2442,7 +2764,7 @@
             <a:fld id="{1D8BD707-D9CF-40AE-B4C6-C98DA3205C09}" type="datetimeFigureOut">
               <a:rPr lang="en-US" smtClean="0"/>
               <a:pPr/>
-              <a:t>11/21/2025</a:t>
+              <a:t>12/1/2025</a:t>
             </a:fld>
             <a:endParaRPr lang="en-US"/>
           </a:p>
@@ -2714,7 +3036,7 @@
             <a:fld id="{1D8BD707-D9CF-40AE-B4C6-C98DA3205C09}" type="datetimeFigureOut">
               <a:rPr lang="en-US" smtClean="0"/>
               <a:pPr/>
-              <a:t>11/21/2025</a:t>
+              <a:t>12/1/2025</a:t>
             </a:fld>
             <a:endParaRPr lang="en-US"/>
           </a:p>
@@ -2963,7 +3285,7 @@
             <a:fld id="{1D8BD707-D9CF-40AE-B4C6-C98DA3205C09}" type="datetimeFigureOut">
               <a:rPr lang="en-US" smtClean="0"/>
               <a:pPr/>
-              <a:t>11/21/2025</a:t>
+              <a:t>12/1/2025</a:t>
             </a:fld>
             <a:endParaRPr lang="en-US"/>
           </a:p>
@@ -3176,7 +3498,7 @@
             <a:fld id="{1D8BD707-D9CF-40AE-B4C6-C98DA3205C09}" type="datetimeFigureOut">
               <a:rPr lang="en-US" smtClean="0"/>
               <a:pPr/>
-              <a:t>11/21/2025</a:t>
+              <a:t>12/1/2025</a:t>
             </a:fld>
             <a:endParaRPr lang="en-US"/>
           </a:p>
@@ -4583,7 +4905,7 @@
                 </a:solidFill>
                 <a:latin typeface="Pragmatica" panose="020B0403040502020204" pitchFamily="34" charset="0"/>
               </a:rPr>
-              <a:t>Email me with any questions: </a:t>
+              <a:t>Email me or use Teams with any questions: </a:t>
             </a:r>
             <a:r>
               <a:rPr lang="en-US" sz="5400" b="1" dirty="0">
@@ -5033,7 +5355,7 @@
                 <a:latin typeface="Pragmatica" panose="020B0403040502020204"/>
                 <a:sym typeface="Consolas"/>
               </a:rPr>
-              <a:t>Excel to Dataverse</a:t>
+              <a:t>(tomorrow) Excel to Dataverse</a:t>
             </a:r>
           </a:p>
           <a:p>
@@ -5059,7 +5381,7 @@
                 <a:latin typeface="Pragmatica" panose="020B0403040502020204"/>
                 <a:sym typeface="Consolas"/>
               </a:rPr>
-              <a:t>Dataverse to Excel </a:t>
+              <a:t>(instructor demo) Dataverse to Excel </a:t>
             </a:r>
           </a:p>
           <a:p>
@@ -5331,7 +5653,7 @@
           <p:nvPr/>
         </p:nvPicPr>
         <p:blipFill>
-          <a:blip r:embed="rId2">
+          <a:blip r:embed="rId3">
             <a:extLst>
               <a:ext uri="{28A0092B-C50C-407E-A947-70E740481C1C}">
                 <a14:useLocalDpi xmlns:a14="http://schemas.microsoft.com/office/drawing/2010/main" val="0"/>
@@ -5403,7 +5725,7 @@
         <p:spPr>
           <a:xfrm>
             <a:off x="520861" y="170082"/>
-            <a:ext cx="14642939" cy="1200329"/>
+            <a:ext cx="14642939" cy="1015663"/>
           </a:xfrm>
           <a:prstGeom prst="rect">
             <a:avLst/>
@@ -5417,10 +5739,10 @@
           <a:lstStyle/>
           <a:p>
             <a:r>
-              <a:rPr lang="en-US" sz="7200" dirty="0">
+              <a:rPr lang="en-US" sz="6000" dirty="0">
                 <a:latin typeface="Aliens &amp; cows" panose="00000500000000000000" pitchFamily="2" charset="0"/>
               </a:rPr>
-              <a:t>Day 2: Data cleaning the modern way</a:t>
+              <a:t>Day 2 preview: Data cleaning the modern way</a:t>
             </a:r>
           </a:p>
         </p:txBody>
@@ -5541,7 +5863,7 @@
           <p:nvPr/>
         </p:nvPicPr>
         <p:blipFill>
-          <a:blip r:embed="rId2">
+          <a:blip r:embed="rId3">
             <a:extLst>
               <a:ext uri="{28A0092B-C50C-407E-A947-70E740481C1C}">
                 <a14:useLocalDpi xmlns:a14="http://schemas.microsoft.com/office/drawing/2010/main" val="0"/>

</xml_diff>